<commit_message>
Actualizando Seccion 3 Diapos
</commit_message>
<xml_diff>
--- a/Seccion 3 Distribución multivariante/Diapositivas/3.2 Curvas de nivel o contornos.pptx
+++ b/Seccion 3 Distribución multivariante/Diapositivas/3.2 Curvas de nivel o contornos.pptx
@@ -271,7 +271,7 @@
             <a:fld id="{B61BEF0D-F0BB-DE4B-95CE-6DB70DBA9567}" type="datetimeFigureOut">
               <a:rPr lang="en-US" smtClean="0"/>
               <a:pPr/>
-              <a:t>12/20/2019</a:t>
+              <a:t>3/26/2020</a:t>
             </a:fld>
             <a:endParaRPr lang="en-US" dirty="0"/>
           </a:p>
@@ -470,7 +470,7 @@
           <a:p>
             <a:fld id="{55C6B4A9-1611-4792-9094-5F34BCA07E0B}" type="datetimeFigureOut">
               <a:rPr lang="en-US" smtClean="0"/>
-              <a:t>12/20/2019</a:t>
+              <a:t>3/26/2020</a:t>
             </a:fld>
             <a:endParaRPr lang="en-US" dirty="0"/>
           </a:p>
@@ -679,7 +679,7 @@
             <a:fld id="{B61BEF0D-F0BB-DE4B-95CE-6DB70DBA9567}" type="datetimeFigureOut">
               <a:rPr lang="en-US" smtClean="0"/>
               <a:pPr/>
-              <a:t>12/20/2019</a:t>
+              <a:t>3/26/2020</a:t>
             </a:fld>
             <a:endParaRPr lang="en-US" dirty="0"/>
           </a:p>
@@ -1499,7 +1499,7 @@
             <a:fld id="{B61BEF0D-F0BB-DE4B-95CE-6DB70DBA9567}" type="datetimeFigureOut">
               <a:rPr lang="en-US" smtClean="0"/>
               <a:pPr/>
-              <a:t>12/20/2019</a:t>
+              <a:t>3/26/2020</a:t>
             </a:fld>
             <a:endParaRPr lang="en-US" dirty="0"/>
           </a:p>
@@ -1671,7 +1671,7 @@
             <a:fld id="{B61BEF0D-F0BB-DE4B-95CE-6DB70DBA9567}" type="datetimeFigureOut">
               <a:rPr lang="en-US" smtClean="0"/>
               <a:pPr/>
-              <a:t>12/20/2019</a:t>
+              <a:t>3/26/2020</a:t>
             </a:fld>
             <a:endParaRPr lang="en-US" dirty="0"/>
           </a:p>
@@ -1920,7 +1920,7 @@
             <a:fld id="{B61BEF0D-F0BB-DE4B-95CE-6DB70DBA9567}" type="datetimeFigureOut">
               <a:rPr lang="en-US" smtClean="0"/>
               <a:pPr/>
-              <a:t>12/20/2019</a:t>
+              <a:t>3/26/2020</a:t>
             </a:fld>
             <a:endParaRPr lang="en-US" dirty="0"/>
           </a:p>
@@ -2153,7 +2153,7 @@
           <a:p>
             <a:fld id="{EB712588-04B1-427B-82EE-E8DB90309F08}" type="datetimeFigureOut">
               <a:rPr lang="en-US" smtClean="0"/>
-              <a:t>12/20/2019</a:t>
+              <a:t>3/26/2020</a:t>
             </a:fld>
             <a:endParaRPr lang="en-US" dirty="0"/>
           </a:p>
@@ -2528,7 +2528,7 @@
             <a:fld id="{B61BEF0D-F0BB-DE4B-95CE-6DB70DBA9567}" type="datetimeFigureOut">
               <a:rPr lang="en-US" smtClean="0"/>
               <a:pPr/>
-              <a:t>12/20/2019</a:t>
+              <a:t>3/26/2020</a:t>
             </a:fld>
             <a:endParaRPr lang="en-US" dirty="0"/>
           </a:p>
@@ -2653,7 +2653,7 @@
             <a:fld id="{B61BEF0D-F0BB-DE4B-95CE-6DB70DBA9567}" type="datetimeFigureOut">
               <a:rPr lang="en-US" smtClean="0"/>
               <a:pPr/>
-              <a:t>12/20/2019</a:t>
+              <a:t>3/26/2020</a:t>
             </a:fld>
             <a:endParaRPr lang="en-US" dirty="0"/>
           </a:p>
@@ -2750,7 +2750,7 @@
             <a:fld id="{B61BEF0D-F0BB-DE4B-95CE-6DB70DBA9567}" type="datetimeFigureOut">
               <a:rPr lang="en-US" smtClean="0"/>
               <a:pPr/>
-              <a:t>12/20/2019</a:t>
+              <a:t>3/26/2020</a:t>
             </a:fld>
             <a:endParaRPr lang="en-US" dirty="0"/>
           </a:p>
@@ -3006,7 +3006,7 @@
           <a:p>
             <a:fld id="{42A54C80-263E-416B-A8E0-580EDEADCBDC}" type="datetimeFigureOut">
               <a:rPr lang="en-US" smtClean="0"/>
-              <a:t>12/20/2019</a:t>
+              <a:t>3/26/2020</a:t>
             </a:fld>
             <a:endParaRPr lang="en-US" dirty="0"/>
           </a:p>
@@ -3193,7 +3193,7 @@
             <a:fld id="{B61BEF0D-F0BB-DE4B-95CE-6DB70DBA9567}" type="datetimeFigureOut">
               <a:rPr lang="en-US" smtClean="0"/>
               <a:pPr/>
-              <a:t>12/20/2019</a:t>
+              <a:t>3/26/2020</a:t>
             </a:fld>
             <a:endParaRPr lang="en-US" dirty="0"/>
           </a:p>
@@ -3513,7 +3513,7 @@
             <a:fld id="{B61BEF0D-F0BB-DE4B-95CE-6DB70DBA9567}" type="datetimeFigureOut">
               <a:rPr lang="en-US" smtClean="0"/>
               <a:pPr/>
-              <a:t>12/20/2019</a:t>
+              <a:t>3/26/2020</a:t>
             </a:fld>
             <a:endParaRPr lang="en-US" dirty="0"/>
           </a:p>
@@ -3723,7 +3723,7 @@
             <a:fld id="{B61BEF0D-F0BB-DE4B-95CE-6DB70DBA9567}" type="datetimeFigureOut">
               <a:rPr lang="en-US" smtClean="0"/>
               <a:pPr/>
-              <a:t>12/20/2019</a:t>
+              <a:t>3/26/2020</a:t>
             </a:fld>
             <a:endParaRPr lang="en-US" dirty="0"/>
           </a:p>
@@ -4039,7 +4039,7 @@
             <a:fld id="{B61BEF0D-F0BB-DE4B-95CE-6DB70DBA9567}" type="datetimeFigureOut">
               <a:rPr lang="en-US" smtClean="0"/>
               <a:pPr/>
-              <a:t>12/20/2019</a:t>
+              <a:t>3/26/2020</a:t>
             </a:fld>
             <a:endParaRPr lang="en-US" dirty="0"/>
           </a:p>
@@ -4374,7 +4374,7 @@
             <a:fld id="{B61BEF0D-F0BB-DE4B-95CE-6DB70DBA9567}" type="datetimeFigureOut">
               <a:rPr lang="en-US" smtClean="0"/>
               <a:pPr/>
-              <a:t>12/20/2019</a:t>
+              <a:t>3/26/2020</a:t>
             </a:fld>
             <a:endParaRPr lang="en-US" dirty="0"/>
           </a:p>
@@ -4690,7 +4690,7 @@
             <a:fld id="{B61BEF0D-F0BB-DE4B-95CE-6DB70DBA9567}" type="datetimeFigureOut">
               <a:rPr lang="en-US" smtClean="0"/>
               <a:pPr/>
-              <a:t>12/20/2019</a:t>
+              <a:t>3/26/2020</a:t>
             </a:fld>
             <a:endParaRPr lang="en-US" dirty="0"/>
           </a:p>
@@ -5085,7 +5085,7 @@
             <a:fld id="{B61BEF0D-F0BB-DE4B-95CE-6DB70DBA9567}" type="datetimeFigureOut">
               <a:rPr lang="en-US" smtClean="0"/>
               <a:pPr/>
-              <a:t>12/20/2019</a:t>
+              <a:t>3/26/2020</a:t>
             </a:fld>
             <a:endParaRPr lang="en-US" dirty="0"/>
           </a:p>
@@ -5256,7 +5256,7 @@
           <a:p>
             <a:fld id="{55C6B4A9-1611-4792-9094-5F34BCA07E0B}" type="datetimeFigureOut">
               <a:rPr lang="en-US" smtClean="0"/>
-              <a:t>12/20/2019</a:t>
+              <a:t>3/26/2020</a:t>
             </a:fld>
             <a:endParaRPr lang="en-US" dirty="0"/>
           </a:p>
@@ -5437,7 +5437,7 @@
             <a:fld id="{B61BEF0D-F0BB-DE4B-95CE-6DB70DBA9567}" type="datetimeFigureOut">
               <a:rPr lang="en-US" smtClean="0"/>
               <a:pPr/>
-              <a:t>12/20/2019</a:t>
+              <a:t>3/26/2020</a:t>
             </a:fld>
             <a:endParaRPr lang="en-US" dirty="0"/>
           </a:p>
@@ -5702,7 +5702,7 @@
             <a:fld id="{B61BEF0D-F0BB-DE4B-95CE-6DB70DBA9567}" type="datetimeFigureOut">
               <a:rPr lang="en-US" smtClean="0"/>
               <a:pPr/>
-              <a:t>12/20/2019</a:t>
+              <a:t>3/26/2020</a:t>
             </a:fld>
             <a:endParaRPr lang="en-US" dirty="0"/>
           </a:p>
@@ -5968,7 +5968,7 @@
           <a:p>
             <a:fld id="{EB712588-04B1-427B-82EE-E8DB90309F08}" type="datetimeFigureOut">
               <a:rPr lang="en-US" smtClean="0"/>
-              <a:t>12/20/2019</a:t>
+              <a:t>3/26/2020</a:t>
             </a:fld>
             <a:endParaRPr lang="en-US" dirty="0"/>
           </a:p>
@@ -6381,7 +6381,7 @@
             <a:fld id="{B61BEF0D-F0BB-DE4B-95CE-6DB70DBA9567}" type="datetimeFigureOut">
               <a:rPr lang="en-US" smtClean="0"/>
               <a:pPr/>
-              <a:t>12/20/2019</a:t>
+              <a:t>3/26/2020</a:t>
             </a:fld>
             <a:endParaRPr lang="en-US" dirty="0"/>
           </a:p>
@@ -6524,7 +6524,7 @@
             <a:fld id="{B61BEF0D-F0BB-DE4B-95CE-6DB70DBA9567}" type="datetimeFigureOut">
               <a:rPr lang="en-US" smtClean="0"/>
               <a:pPr/>
-              <a:t>12/20/2019</a:t>
+              <a:t>3/26/2020</a:t>
             </a:fld>
             <a:endParaRPr lang="en-US" dirty="0"/>
           </a:p>
@@ -6639,7 +6639,7 @@
             <a:fld id="{B61BEF0D-F0BB-DE4B-95CE-6DB70DBA9567}" type="datetimeFigureOut">
               <a:rPr lang="en-US" smtClean="0"/>
               <a:pPr/>
-              <a:t>12/20/2019</a:t>
+              <a:t>3/26/2020</a:t>
             </a:fld>
             <a:endParaRPr lang="en-US" dirty="0"/>
           </a:p>
@@ -6951,7 +6951,7 @@
           <a:p>
             <a:fld id="{42A54C80-263E-416B-A8E0-580EDEADCBDC}" type="datetimeFigureOut">
               <a:rPr lang="en-US" smtClean="0"/>
-              <a:t>12/20/2019</a:t>
+              <a:t>3/26/2020</a:t>
             </a:fld>
             <a:endParaRPr lang="en-US" dirty="0"/>
           </a:p>
@@ -7240,7 +7240,7 @@
             <a:fld id="{B61BEF0D-F0BB-DE4B-95CE-6DB70DBA9567}" type="datetimeFigureOut">
               <a:rPr lang="en-US" smtClean="0"/>
               <a:pPr/>
-              <a:t>12/20/2019</a:t>
+              <a:t>3/26/2020</a:t>
             </a:fld>
             <a:endParaRPr lang="en-US" dirty="0"/>
           </a:p>
@@ -7486,7 +7486,7 @@
             <a:fld id="{B61BEF0D-F0BB-DE4B-95CE-6DB70DBA9567}" type="datetimeFigureOut">
               <a:rPr lang="en-US" smtClean="0"/>
               <a:pPr/>
-              <a:t>12/20/2019</a:t>
+              <a:t>3/26/2020</a:t>
             </a:fld>
             <a:endParaRPr lang="en-US" dirty="0"/>
           </a:p>
@@ -8574,7 +8574,7 @@
             <a:fld id="{B61BEF0D-F0BB-DE4B-95CE-6DB70DBA9567}" type="datetimeFigureOut">
               <a:rPr lang="en-US" smtClean="0"/>
               <a:pPr/>
-              <a:t>12/20/2019</a:t>
+              <a:t>3/26/2020</a:t>
             </a:fld>
             <a:endParaRPr lang="en-US" dirty="0"/>
           </a:p>
@@ -11688,7 +11688,7 @@
                         <m:sSub>
                           <m:sSubPr>
                             <m:ctrlPr>
-                              <a:rPr lang="es-ES" b="1" i="0" smtClean="0">
+                              <a:rPr lang="es-ES" b="1" i="1" smtClean="0">
                                 <a:solidFill>
                                   <a:schemeClr val="bg1"/>
                                 </a:solidFill>
@@ -11781,7 +11781,7 @@
                       <a:schemeClr val="bg1"/>
                     </a:solidFill>
                   </a:rPr>
-                  <a:t> es Normal bivariante con vector de medias </a:t>
+                  <a:t> es Normal multivariante con vector de medias </a:t>
                 </a:r>
                 <a14:m>
                   <m:oMath xmlns:m="http://schemas.openxmlformats.org/officeDocument/2006/math">
@@ -11837,7 +11837,7 @@
                     <m:sSub>
                       <m:sSubPr>
                         <m:ctrlPr>
-                          <a:rPr lang="es-ES" b="0" i="0" smtClean="0">
+                          <a:rPr lang="es-ES" b="0" i="1" smtClean="0">
                             <a:solidFill>
                               <a:schemeClr val="bg1"/>
                             </a:solidFill>
@@ -12091,7 +12091,7 @@
                                       <m:sSub>
                                         <m:sSubPr>
                                           <m:ctrlPr>
-                                            <a:rPr lang="es-ES" b="0" i="0" smtClean="0">
+                                            <a:rPr lang="es-ES" b="0" i="1" smtClean="0">
                                               <a:solidFill>
                                                 <a:schemeClr val="bg1"/>
                                               </a:solidFill>
@@ -12327,7 +12327,7 @@
                               <m:sSubSup>
                                 <m:sSubSupPr>
                                   <m:ctrlPr>
-                                    <a:rPr lang="es-ES" b="0" i="0" smtClean="0">
+                                    <a:rPr lang="es-ES" b="0" i="1" smtClean="0">
                                       <a:solidFill>
                                         <a:schemeClr val="bg1"/>
                                       </a:solidFill>
@@ -13263,40 +13263,38 @@
                             </a:rPr>
                             <m:t>−2</m:t>
                           </m:r>
-                          <m:r>
-                            <a:rPr lang="es-ES" i="1">
-                              <a:solidFill>
-                                <a:srgbClr val="FFC000"/>
-                              </a:solidFill>
-                              <a:latin typeface="Cambria Math" panose="02040503050406030204" pitchFamily="18" charset="0"/>
-                            </a:rPr>
-                            <m:t>𝑘</m:t>
-                          </m:r>
-                          <m:sSup>
-                            <m:sSupPr>
+                          <m:func>
+                            <m:funcPr>
                               <m:ctrlPr>
-                                <a:rPr lang="es-ES" i="1">
+                                <a:rPr lang="es-ES" b="0" i="1" smtClean="0">
                                   <a:solidFill>
                                     <a:srgbClr val="FFC000"/>
                                   </a:solidFill>
                                   <a:latin typeface="Cambria Math" panose="02040503050406030204" pitchFamily="18" charset="0"/>
                                 </a:rPr>
                               </m:ctrlPr>
-                            </m:sSupPr>
-                            <m:e>
+                            </m:funcPr>
+                            <m:fName>
                               <m:r>
-                                <a:rPr lang="es-ES" i="1">
+                                <m:rPr>
+                                  <m:sty m:val="p"/>
+                                </m:rPr>
+                                <a:rPr lang="es-ES" b="0" i="0" smtClean="0">
                                   <a:solidFill>
                                     <a:srgbClr val="FFC000"/>
                                   </a:solidFill>
                                   <a:latin typeface="Cambria Math" panose="02040503050406030204" pitchFamily="18" charset="0"/>
                                 </a:rPr>
-                                <m:t> </m:t>
+                                <m:t>log</m:t>
                               </m:r>
+                            </m:fName>
+                            <m:e>
                               <m:d>
                                 <m:dPr>
+                                  <m:begChr m:val="{"/>
+                                  <m:endChr m:val="}"/>
                                   <m:ctrlPr>
-                                    <a:rPr lang="es-ES" i="1">
+                                    <a:rPr lang="es-ES" b="0" i="1" smtClean="0">
                                       <a:solidFill>
                                         <a:srgbClr val="FFC000"/>
                                       </a:solidFill>
@@ -13312,98 +13310,10 @@
                                       </a:solidFill>
                                       <a:latin typeface="Cambria Math" panose="02040503050406030204" pitchFamily="18" charset="0"/>
                                     </a:rPr>
-                                    <m:t>2 </m:t>
+                                    <m:t>𝑘</m:t>
                                   </m:r>
-                                  <m:r>
-                                    <a:rPr lang="es-ES" i="1">
-                                      <a:solidFill>
-                                        <a:srgbClr val="FFC000"/>
-                                      </a:solidFill>
-                                      <a:latin typeface="Cambria Math" panose="02040503050406030204" pitchFamily="18" charset="0"/>
-                                    </a:rPr>
-                                    <m:t>𝜋</m:t>
-                                  </m:r>
-                                </m:e>
-                              </m:d>
-                            </m:e>
-                            <m:sup>
-                              <m:f>
-                                <m:fPr>
-                                  <m:type m:val="lin"/>
-                                  <m:ctrlPr>
-                                    <a:rPr lang="es-ES" i="1">
-                                      <a:solidFill>
-                                        <a:srgbClr val="FFC000"/>
-                                      </a:solidFill>
-                                      <a:latin typeface="Cambria Math" panose="02040503050406030204" pitchFamily="18" charset="0"/>
-                                    </a:rPr>
-                                  </m:ctrlPr>
-                                </m:fPr>
-                                <m:num>
-                                  <m:r>
-                                    <a:rPr lang="es-ES" i="1">
-                                      <a:solidFill>
-                                        <a:srgbClr val="FFC000"/>
-                                      </a:solidFill>
-                                      <a:latin typeface="Cambria Math" panose="02040503050406030204" pitchFamily="18" charset="0"/>
-                                    </a:rPr>
-                                    <m:t>𝑝</m:t>
-                                  </m:r>
-                                </m:num>
-                                <m:den>
-                                  <m:r>
-                                    <a:rPr lang="es-ES" i="1">
-                                      <a:solidFill>
-                                        <a:srgbClr val="FFC000"/>
-                                      </a:solidFill>
-                                      <a:latin typeface="Cambria Math" panose="02040503050406030204" pitchFamily="18" charset="0"/>
-                                    </a:rPr>
-                                    <m:t>2</m:t>
-                                  </m:r>
-                                </m:den>
-                              </m:f>
-                            </m:sup>
-                          </m:sSup>
-                          <m:sSup>
-                            <m:sSupPr>
-                              <m:ctrlPr>
-                                <a:rPr lang="es-ES" i="1">
-                                  <a:solidFill>
-                                    <a:srgbClr val="FFC000"/>
-                                  </a:solidFill>
-                                  <a:latin typeface="Cambria Math" panose="02040503050406030204" pitchFamily="18" charset="0"/>
-                                </a:rPr>
-                              </m:ctrlPr>
-                            </m:sSupPr>
-                            <m:e>
-                              <m:func>
-                                <m:funcPr>
-                                  <m:ctrlPr>
-                                    <a:rPr lang="es-ES" i="1">
-                                      <a:solidFill>
-                                        <a:srgbClr val="FFC000"/>
-                                      </a:solidFill>
-                                      <a:latin typeface="Cambria Math" panose="02040503050406030204" pitchFamily="18" charset="0"/>
-                                    </a:rPr>
-                                  </m:ctrlPr>
-                                </m:funcPr>
-                                <m:fName>
-                                  <m:r>
-                                    <m:rPr>
-                                      <m:sty m:val="p"/>
-                                    </m:rPr>
-                                    <a:rPr lang="es-ES">
-                                      <a:solidFill>
-                                        <a:srgbClr val="FFC000"/>
-                                      </a:solidFill>
-                                      <a:latin typeface="Cambria Math" panose="02040503050406030204" pitchFamily="18" charset="0"/>
-                                    </a:rPr>
-                                    <m:t>det</m:t>
-                                  </m:r>
-                                </m:fName>
-                                <m:e>
-                                  <m:d>
-                                    <m:dPr>
+                                  <m:sSup>
+                                    <m:sSupPr>
                                       <m:ctrlPr>
                                         <a:rPr lang="es-ES" i="1">
                                           <a:solidFill>
@@ -13412,10 +13322,19 @@
                                           <a:latin typeface="Cambria Math" panose="02040503050406030204" pitchFamily="18" charset="0"/>
                                         </a:rPr>
                                       </m:ctrlPr>
-                                    </m:dPr>
+                                    </m:sSupPr>
                                     <m:e>
-                                      <m:sSub>
-                                        <m:sSubPr>
+                                      <m:r>
+                                        <a:rPr lang="es-ES" i="1">
+                                          <a:solidFill>
+                                            <a:srgbClr val="FFC000"/>
+                                          </a:solidFill>
+                                          <a:latin typeface="Cambria Math" panose="02040503050406030204" pitchFamily="18" charset="0"/>
+                                        </a:rPr>
+                                        <m:t> </m:t>
+                                      </m:r>
+                                      <m:d>
+                                        <m:dPr>
                                           <m:ctrlPr>
                                             <a:rPr lang="es-ES" i="1">
                                               <a:solidFill>
@@ -13424,8 +13343,91 @@
                                               <a:latin typeface="Cambria Math" panose="02040503050406030204" pitchFamily="18" charset="0"/>
                                             </a:rPr>
                                           </m:ctrlPr>
-                                        </m:sSubPr>
+                                        </m:dPr>
                                         <m:e>
+                                          <m:r>
+                                            <a:rPr lang="es-ES" i="1">
+                                              <a:solidFill>
+                                                <a:srgbClr val="FFC000"/>
+                                              </a:solidFill>
+                                              <a:latin typeface="Cambria Math" panose="02040503050406030204" pitchFamily="18" charset="0"/>
+                                            </a:rPr>
+                                            <m:t>2 </m:t>
+                                          </m:r>
+                                          <m:r>
+                                            <a:rPr lang="es-ES" i="1">
+                                              <a:solidFill>
+                                                <a:srgbClr val="FFC000"/>
+                                              </a:solidFill>
+                                              <a:latin typeface="Cambria Math" panose="02040503050406030204" pitchFamily="18" charset="0"/>
+                                            </a:rPr>
+                                            <m:t>𝜋</m:t>
+                                          </m:r>
+                                        </m:e>
+                                      </m:d>
+                                    </m:e>
+                                    <m:sup>
+                                      <m:f>
+                                        <m:fPr>
+                                          <m:type m:val="lin"/>
+                                          <m:ctrlPr>
+                                            <a:rPr lang="es-ES" i="1">
+                                              <a:solidFill>
+                                                <a:srgbClr val="FFC000"/>
+                                              </a:solidFill>
+                                              <a:latin typeface="Cambria Math" panose="02040503050406030204" pitchFamily="18" charset="0"/>
+                                            </a:rPr>
+                                          </m:ctrlPr>
+                                        </m:fPr>
+                                        <m:num>
+                                          <m:r>
+                                            <a:rPr lang="es-ES" i="1">
+                                              <a:solidFill>
+                                                <a:srgbClr val="FFC000"/>
+                                              </a:solidFill>
+                                              <a:latin typeface="Cambria Math" panose="02040503050406030204" pitchFamily="18" charset="0"/>
+                                            </a:rPr>
+                                            <m:t>𝑝</m:t>
+                                          </m:r>
+                                        </m:num>
+                                        <m:den>
+                                          <m:r>
+                                            <a:rPr lang="es-ES" i="1">
+                                              <a:solidFill>
+                                                <a:srgbClr val="FFC000"/>
+                                              </a:solidFill>
+                                              <a:latin typeface="Cambria Math" panose="02040503050406030204" pitchFamily="18" charset="0"/>
+                                            </a:rPr>
+                                            <m:t>2</m:t>
+                                          </m:r>
+                                        </m:den>
+                                      </m:f>
+                                    </m:sup>
+                                  </m:sSup>
+                                  <m:sSup>
+                                    <m:sSupPr>
+                                      <m:ctrlPr>
+                                        <a:rPr lang="es-ES" i="1">
+                                          <a:solidFill>
+                                            <a:srgbClr val="FFC000"/>
+                                          </a:solidFill>
+                                          <a:latin typeface="Cambria Math" panose="02040503050406030204" pitchFamily="18" charset="0"/>
+                                        </a:rPr>
+                                      </m:ctrlPr>
+                                    </m:sSupPr>
+                                    <m:e>
+                                      <m:func>
+                                        <m:funcPr>
+                                          <m:ctrlPr>
+                                            <a:rPr lang="es-ES" i="1">
+                                              <a:solidFill>
+                                                <a:srgbClr val="FFC000"/>
+                                              </a:solidFill>
+                                              <a:latin typeface="Cambria Math" panose="02040503050406030204" pitchFamily="18" charset="0"/>
+                                            </a:rPr>
+                                          </m:ctrlPr>
+                                        </m:funcPr>
+                                        <m:fName>
                                           <m:r>
                                             <m:rPr>
                                               <m:sty m:val="p"/>
@@ -13436,67 +13438,109 @@
                                               </a:solidFill>
                                               <a:latin typeface="Cambria Math" panose="02040503050406030204" pitchFamily="18" charset="0"/>
                                             </a:rPr>
-                                            <m:t>Σ</m:t>
+                                            <m:t>det</m:t>
                                           </m:r>
+                                        </m:fName>
+                                        <m:e>
+                                          <m:d>
+                                            <m:dPr>
+                                              <m:ctrlPr>
+                                                <a:rPr lang="es-ES" i="1">
+                                                  <a:solidFill>
+                                                    <a:srgbClr val="FFC000"/>
+                                                  </a:solidFill>
+                                                  <a:latin typeface="Cambria Math" panose="02040503050406030204" pitchFamily="18" charset="0"/>
+                                                </a:rPr>
+                                              </m:ctrlPr>
+                                            </m:dPr>
+                                            <m:e>
+                                              <m:sSub>
+                                                <m:sSubPr>
+                                                  <m:ctrlPr>
+                                                    <a:rPr lang="es-ES" i="1">
+                                                      <a:solidFill>
+                                                        <a:srgbClr val="FFC000"/>
+                                                      </a:solidFill>
+                                                      <a:latin typeface="Cambria Math" panose="02040503050406030204" pitchFamily="18" charset="0"/>
+                                                    </a:rPr>
+                                                  </m:ctrlPr>
+                                                </m:sSubPr>
+                                                <m:e>
+                                                  <m:r>
+                                                    <m:rPr>
+                                                      <m:sty m:val="p"/>
+                                                    </m:rPr>
+                                                    <a:rPr lang="es-ES">
+                                                      <a:solidFill>
+                                                        <a:srgbClr val="FFC000"/>
+                                                      </a:solidFill>
+                                                      <a:latin typeface="Cambria Math" panose="02040503050406030204" pitchFamily="18" charset="0"/>
+                                                    </a:rPr>
+                                                    <m:t>Σ</m:t>
+                                                  </m:r>
+                                                </m:e>
+                                                <m:sub>
+                                                  <m:r>
+                                                    <m:rPr>
+                                                      <m:sty m:val="p"/>
+                                                    </m:rPr>
+                                                    <a:rPr lang="es-ES">
+                                                      <a:solidFill>
+                                                        <a:srgbClr val="FFC000"/>
+                                                      </a:solidFill>
+                                                      <a:latin typeface="Cambria Math" panose="02040503050406030204" pitchFamily="18" charset="0"/>
+                                                    </a:rPr>
+                                                    <m:t>x</m:t>
+                                                  </m:r>
+                                                </m:sub>
+                                              </m:sSub>
+                                            </m:e>
+                                          </m:d>
                                         </m:e>
-                                        <m:sub>
-                                          <m:r>
-                                            <m:rPr>
-                                              <m:sty m:val="p"/>
-                                            </m:rPr>
-                                            <a:rPr lang="es-ES">
+                                      </m:func>
+                                    </m:e>
+                                    <m:sup>
+                                      <m:f>
+                                        <m:fPr>
+                                          <m:type m:val="lin"/>
+                                          <m:ctrlPr>
+                                            <a:rPr lang="es-ES" i="1">
                                               <a:solidFill>
                                                 <a:srgbClr val="FFC000"/>
                                               </a:solidFill>
                                               <a:latin typeface="Cambria Math" panose="02040503050406030204" pitchFamily="18" charset="0"/>
                                             </a:rPr>
-                                            <m:t>x</m:t>
+                                          </m:ctrlPr>
+                                        </m:fPr>
+                                        <m:num>
+                                          <m:r>
+                                            <a:rPr lang="es-ES" i="1">
+                                              <a:solidFill>
+                                                <a:srgbClr val="FFC000"/>
+                                              </a:solidFill>
+                                              <a:latin typeface="Cambria Math" panose="02040503050406030204" pitchFamily="18" charset="0"/>
+                                            </a:rPr>
+                                            <m:t>1</m:t>
                                           </m:r>
-                                        </m:sub>
-                                      </m:sSub>
-                                    </m:e>
-                                  </m:d>
+                                        </m:num>
+                                        <m:den>
+                                          <m:r>
+                                            <a:rPr lang="es-ES" i="1">
+                                              <a:solidFill>
+                                                <a:srgbClr val="FFC000"/>
+                                              </a:solidFill>
+                                              <a:latin typeface="Cambria Math" panose="02040503050406030204" pitchFamily="18" charset="0"/>
+                                            </a:rPr>
+                                            <m:t>2</m:t>
+                                          </m:r>
+                                        </m:den>
+                                      </m:f>
+                                    </m:sup>
+                                  </m:sSup>
                                 </m:e>
-                              </m:func>
+                              </m:d>
                             </m:e>
-                            <m:sup>
-                              <m:f>
-                                <m:fPr>
-                                  <m:type m:val="lin"/>
-                                  <m:ctrlPr>
-                                    <a:rPr lang="es-ES" i="1">
-                                      <a:solidFill>
-                                        <a:srgbClr val="FFC000"/>
-                                      </a:solidFill>
-                                      <a:latin typeface="Cambria Math" panose="02040503050406030204" pitchFamily="18" charset="0"/>
-                                    </a:rPr>
-                                  </m:ctrlPr>
-                                </m:fPr>
-                                <m:num>
-                                  <m:r>
-                                    <a:rPr lang="es-ES" i="1">
-                                      <a:solidFill>
-                                        <a:srgbClr val="FFC000"/>
-                                      </a:solidFill>
-                                      <a:latin typeface="Cambria Math" panose="02040503050406030204" pitchFamily="18" charset="0"/>
-                                    </a:rPr>
-                                    <m:t>1</m:t>
-                                  </m:r>
-                                </m:num>
-                                <m:den>
-                                  <m:r>
-                                    <a:rPr lang="es-ES" i="1">
-                                      <a:solidFill>
-                                        <a:srgbClr val="FFC000"/>
-                                      </a:solidFill>
-                                      <a:latin typeface="Cambria Math" panose="02040503050406030204" pitchFamily="18" charset="0"/>
-                                    </a:rPr>
-                                    <m:t>2</m:t>
-                                  </m:r>
-                                </m:den>
-                              </m:f>
-                            </m:sup>
-                          </m:sSup>
+                          </m:func>
                           <m:r>
                             <a:rPr lang="es-ES" b="0" i="1" smtClean="0">
                               <a:solidFill>
@@ -13938,8 +13982,8 @@
           </a:p>
         </p:txBody>
       </p:sp>
-      <mc:AlternateContent xmlns:mc="http://schemas.openxmlformats.org/markup-compatibility/2006">
-        <mc:Choice xmlns:a14="http://schemas.microsoft.com/office/drawing/2010/main" Requires="a14">
+      <mc:AlternateContent xmlns:mc="http://schemas.openxmlformats.org/markup-compatibility/2006" xmlns:a14="http://schemas.microsoft.com/office/drawing/2010/main">
+        <mc:Choice Requires="a14">
           <p:sp>
             <p:nvSpPr>
               <p:cNvPr id="5" name="Marcador de contenido 2"/>
@@ -14714,7 +14758,7 @@
             </p:txBody>
           </p:sp>
         </mc:Choice>
-        <mc:Fallback>
+        <mc:Fallback xmlns="">
           <p:sp>
             <p:nvSpPr>
               <p:cNvPr id="5" name="Marcador de contenido 2"/>

</xml_diff>